<commit_message>
added pdf presentations + colortheory.pdf
</commit_message>
<xml_diff>
--- a/Kursmateriell/presentasjoner/Webatlas.js-kart-pa-web.pptx
+++ b/Kursmateriell/presentasjoner/Webatlas.js-kart-pa-web.pptx
@@ -242,7 +242,7 @@
           <a:p>
             <a:fld id="{2F3076B3-A1C7-42B7-BAE7-FC622E9E1FEE}" type="datetimeFigureOut">
               <a:rPr lang="nb-NO" smtClean="0"/>
-              <a:t>18.02.2014</a:t>
+              <a:t>07.04.2014</a:t>
             </a:fld>
             <a:endParaRPr lang="nb-NO"/>
           </a:p>
@@ -5759,7 +5759,7 @@
           <a:noFill/>
           <a:extLst>
             <a:ext uri="{909E8E84-426E-40dd-AFC4-6F175D3DCCD1}">
-              <a14:hiddenFill xmlns:a14="http://schemas.microsoft.com/office/drawing/2010/main" xmlns="">
+              <a14:hiddenFill xmlns="" xmlns:a14="http://schemas.microsoft.com/office/drawing/2010/main">
                 <a:solidFill>
                   <a:srgbClr val="FFFFFF"/>
                 </a:solidFill>
@@ -5800,7 +5800,7 @@
           <a:noFill/>
           <a:extLst>
             <a:ext uri="{909E8E84-426E-40dd-AFC4-6F175D3DCCD1}">
-              <a14:hiddenFill xmlns:a14="http://schemas.microsoft.com/office/drawing/2010/main" xmlns="">
+              <a14:hiddenFill xmlns="" xmlns:a14="http://schemas.microsoft.com/office/drawing/2010/main">
                 <a:solidFill>
                   <a:srgbClr val="FFFFFF"/>
                 </a:solidFill>
@@ -5906,14 +5906,14 @@
           </a:ln>
           <a:extLst>
             <a:ext uri="{909E8E84-426E-40dd-AFC4-6F175D3DCCD1}">
-              <a14:hiddenFill xmlns:a14="http://schemas.microsoft.com/office/drawing/2010/main" xmlns="">
+              <a14:hiddenFill xmlns="" xmlns:a14="http://schemas.microsoft.com/office/drawing/2010/main">
                 <a:solidFill>
                   <a:srgbClr val="FFFFFF"/>
                 </a:solidFill>
               </a14:hiddenFill>
             </a:ext>
             <a:ext uri="{91240B29-F687-4f45-9708-019B960494DF}">
-              <a14:hiddenLine xmlns:a14="http://schemas.microsoft.com/office/drawing/2010/main" xmlns="" w="9525">
+              <a14:hiddenLine xmlns="" xmlns:a14="http://schemas.microsoft.com/office/drawing/2010/main" w="9525">
                 <a:solidFill>
                   <a:schemeClr val="tx1"/>
                 </a:solidFill>
@@ -5947,14 +5947,14 @@
           </a:ln>
           <a:extLst>
             <a:ext uri="{909E8E84-426E-40dd-AFC4-6F175D3DCCD1}">
-              <a14:hiddenFill xmlns:a14="http://schemas.microsoft.com/office/drawing/2010/main" xmlns="">
+              <a14:hiddenFill xmlns="" xmlns:a14="http://schemas.microsoft.com/office/drawing/2010/main">
                 <a:solidFill>
                   <a:srgbClr val="FFFFFF"/>
                 </a:solidFill>
               </a14:hiddenFill>
             </a:ext>
             <a:ext uri="{91240B29-F687-4f45-9708-019B960494DF}">
-              <a14:hiddenLine xmlns:a14="http://schemas.microsoft.com/office/drawing/2010/main" xmlns="" w="12700" cap="rnd">
+              <a14:hiddenLine xmlns="" xmlns:a14="http://schemas.microsoft.com/office/drawing/2010/main" w="12700" cap="rnd">
                 <a:solidFill>
                   <a:schemeClr val="tx1"/>
                 </a:solidFill>
@@ -6772,7 +6772,7 @@
         <p:spPr>
           <a:xfrm>
             <a:off x="1626551" y="2558189"/>
-            <a:ext cx="1838960" cy="1117229"/>
+            <a:ext cx="1838960" cy="1366528"/>
           </a:xfrm>
           <a:prstGeom prst="rect">
             <a:avLst/>
@@ -6847,7 +6847,29 @@
               </a:buClr>
             </a:pPr>
             <a:r>
-              <a:rPr lang="nb-NO" sz="1350">
+              <a:rPr lang="nb-NO" sz="1350" smtClean="0">
+                <a:solidFill>
+                  <a:prstClr val="white">
+                    <a:lumMod val="95000"/>
+                  </a:prstClr>
+                </a:solidFill>
+                <a:latin typeface="Arial" pitchFamily="34" charset="0"/>
+                <a:cs typeface="Arial" pitchFamily="34" charset="0"/>
+              </a:rPr>
+              <a:t>Brackets</a:t>
+            </a:r>
+          </a:p>
+          <a:p>
+            <a:pPr marL="342900" lvl="1" defTabSz="685800">
+              <a:spcBef>
+                <a:spcPct val="20000"/>
+              </a:spcBef>
+              <a:buClr>
+                <a:srgbClr val="97D700"/>
+              </a:buClr>
+            </a:pPr>
+            <a:r>
+              <a:rPr lang="nb-NO" sz="1350" smtClean="0">
                 <a:solidFill>
                   <a:prstClr val="white">
                     <a:lumMod val="95000"/>
@@ -6858,6 +6880,15 @@
               </a:rPr>
               <a:t>Textmate</a:t>
             </a:r>
+            <a:endParaRPr lang="nb-NO" sz="1350">
+              <a:solidFill>
+                <a:prstClr val="white">
+                  <a:lumMod val="95000"/>
+                </a:prstClr>
+              </a:solidFill>
+              <a:latin typeface="Arial" pitchFamily="34" charset="0"/>
+              <a:cs typeface="Arial" pitchFamily="34" charset="0"/>
+            </a:endParaRPr>
           </a:p>
           <a:p>
             <a:pPr marL="342900" lvl="1" defTabSz="685800">
@@ -7171,7 +7202,7 @@
           <a:noFill/>
           <a:extLst>
             <a:ext uri="{909E8E84-426E-40dd-AFC4-6F175D3DCCD1}">
-              <a14:hiddenFill xmlns:a14="http://schemas.microsoft.com/office/drawing/2010/main" xmlns="">
+              <a14:hiddenFill xmlns="" xmlns:a14="http://schemas.microsoft.com/office/drawing/2010/main">
                 <a:solidFill>
                   <a:srgbClr val="FFFFFF"/>
                 </a:solidFill>
@@ -7483,7 +7514,7 @@
           <a:noFill/>
           <a:extLst>
             <a:ext uri="{909E8E84-426E-40dd-AFC4-6F175D3DCCD1}">
-              <a14:hiddenFill xmlns:a14="http://schemas.microsoft.com/office/drawing/2010/main" xmlns="">
+              <a14:hiddenFill xmlns="" xmlns:a14="http://schemas.microsoft.com/office/drawing/2010/main">
                 <a:solidFill>
                   <a:srgbClr val="FFFFFF"/>
                 </a:solidFill>
@@ -7524,7 +7555,7 @@
           <a:noFill/>
           <a:extLst>
             <a:ext uri="{909E8E84-426E-40dd-AFC4-6F175D3DCCD1}">
-              <a14:hiddenFill xmlns:a14="http://schemas.microsoft.com/office/drawing/2010/main" xmlns="">
+              <a14:hiddenFill xmlns="" xmlns:a14="http://schemas.microsoft.com/office/drawing/2010/main">
                 <a:solidFill>
                   <a:srgbClr val="FFFFFF"/>
                 </a:solidFill>
@@ -7664,7 +7695,7 @@
           <a:noFill/>
           <a:extLst>
             <a:ext uri="{909E8E84-426E-40dd-AFC4-6F175D3DCCD1}">
-              <a14:hiddenFill xmlns:a14="http://schemas.microsoft.com/office/drawing/2010/main" xmlns="">
+              <a14:hiddenFill xmlns="" xmlns:a14="http://schemas.microsoft.com/office/drawing/2010/main">
                 <a:solidFill>
                   <a:srgbClr val="FFFFFF"/>
                 </a:solidFill>
@@ -7976,7 +8007,7 @@
           <a:noFill/>
           <a:extLst>
             <a:ext uri="{909E8E84-426E-40dd-AFC4-6F175D3DCCD1}">
-              <a14:hiddenFill xmlns:a14="http://schemas.microsoft.com/office/drawing/2010/main" xmlns="">
+              <a14:hiddenFill xmlns="" xmlns:a14="http://schemas.microsoft.com/office/drawing/2010/main">
                 <a:solidFill>
                   <a:srgbClr val="FFFFFF"/>
                 </a:solidFill>
@@ -11322,7 +11353,7 @@
           <a:noFill/>
           <a:extLst>
             <a:ext uri="{909E8E84-426E-40dd-AFC4-6F175D3DCCD1}">
-              <a14:hiddenFill xmlns:a14="http://schemas.microsoft.com/office/drawing/2010/main" xmlns="">
+              <a14:hiddenFill xmlns="" xmlns:a14="http://schemas.microsoft.com/office/drawing/2010/main">
                 <a:solidFill>
                   <a:srgbClr val="FFFFFF"/>
                 </a:solidFill>
@@ -11446,7 +11477,7 @@
           <a:noFill/>
           <a:extLst>
             <a:ext uri="{909E8E84-426E-40dd-AFC4-6F175D3DCCD1}">
-              <a14:hiddenFill xmlns:a14="http://schemas.microsoft.com/office/drawing/2010/main" xmlns="">
+              <a14:hiddenFill xmlns="" xmlns:a14="http://schemas.microsoft.com/office/drawing/2010/main">
                 <a:solidFill>
                   <a:srgbClr val="FFFFFF"/>
                 </a:solidFill>
@@ -12005,12 +12036,12 @@
               <a:t>someName</a:t>
             </a:r>
             <a:r>
-              <a:rPr lang="nb-NO" dirty="0" smtClean="0"/>
+              <a:rPr lang="nb-NO" smtClean="0"/>
               <a:t>({</a:t>
             </a:r>
             <a:r>
-              <a:rPr lang="nb-NO" dirty="0" err="1" smtClean="0"/>
-              <a:t>onEacn:kalltilbake</a:t>
+              <a:rPr lang="nb-NO" smtClean="0"/>
+              <a:t>onEach:kalltilbake</a:t>
             </a:r>
             <a:r>
               <a:rPr lang="nb-NO" dirty="0" smtClean="0"/>
@@ -12127,7 +12158,7 @@
           <a:noFill/>
           <a:extLst>
             <a:ext uri="{909E8E84-426E-40dd-AFC4-6F175D3DCCD1}">
-              <a14:hiddenFill xmlns:a14="http://schemas.microsoft.com/office/drawing/2010/main" xmlns="">
+              <a14:hiddenFill xmlns="" xmlns:a14="http://schemas.microsoft.com/office/drawing/2010/main">
                 <a:solidFill>
                   <a:srgbClr val="FFFFFF"/>
                 </a:solidFill>
@@ -12166,7 +12197,7 @@
           <a:noFill/>
           <a:extLst>
             <a:ext uri="{909E8E84-426E-40dd-AFC4-6F175D3DCCD1}">
-              <a14:hiddenFill xmlns:a14="http://schemas.microsoft.com/office/drawing/2010/main" xmlns="">
+              <a14:hiddenFill xmlns="" xmlns:a14="http://schemas.microsoft.com/office/drawing/2010/main">
                 <a:solidFill>
                   <a:srgbClr val="FFFFFF"/>
                 </a:solidFill>

</xml_diff>